<commit_message>
better calculations and more documentation
</commit_message>
<xml_diff>
--- a/Signal/General/SpectralKurtosisInputBuffering.pptx
+++ b/Signal/General/SpectralKurtosisInputBuffering.pptx
@@ -3739,7 +3739,7 @@
               <a:t> - M) / </a:t>
             </a:r>
             <a:r>
-              <a:rPr lang="en-US" sz="2400">
+              <a:rPr lang="en-US" sz="2400" dirty="0" err="1">
                 <a:solidFill>
                   <a:schemeClr val="accent1"/>
                 </a:solidFill>
@@ -3747,7 +3747,7 @@
               <a:t>idat</a:t>
             </a:r>
             <a:r>
-              <a:rPr lang="en-US" sz="2400" baseline="-25000">
+              <a:rPr lang="en-US" sz="2400" baseline="-25000" dirty="0" err="1">
                 <a:solidFill>
                   <a:schemeClr val="accent1"/>
                 </a:solidFill>
@@ -3755,20 +3755,12 @@
               <a:t>off</a:t>
             </a:r>
             <a:r>
-              <a:rPr lang="en-US" sz="2400">
-                <a:solidFill>
-                  <a:schemeClr val="accent1"/>
-                </a:solidFill>
-              </a:rPr>
-              <a:t> </a:t>
-            </a:r>
-            <a:r>
               <a:rPr lang="en-US" sz="2400" dirty="0">
                 <a:solidFill>
                   <a:schemeClr val="accent1"/>
                 </a:solidFill>
               </a:rPr>
-              <a:t>+ 1</a:t>
+              <a:t> + 1</a:t>
             </a:r>
           </a:p>
           <a:p>
@@ -5750,8 +5742,8 @@
         </p:nvSpPr>
         <p:spPr>
           <a:xfrm>
-            <a:off x="681038" y="71918"/>
-            <a:ext cx="8543925" cy="1325563"/>
+            <a:off x="681038" y="0"/>
+            <a:ext cx="8543925" cy="1018752"/>
           </a:xfrm>
         </p:spPr>
         <p:txBody>
@@ -5783,8 +5775,8 @@
         </p:nvSpPr>
         <p:spPr>
           <a:xfrm>
-            <a:off x="681038" y="1438577"/>
-            <a:ext cx="8543925" cy="4851400"/>
+            <a:off x="681038" y="1018752"/>
+            <a:ext cx="8543925" cy="5839248"/>
           </a:xfrm>
         </p:spPr>
         <p:txBody>
@@ -5807,7 +5799,7 @@
             </a:r>
             <a:r>
               <a:rPr lang="en-NZ" dirty="0"/>
-              <a:t> samples overlap by a factor of </a:t>
+              <a:t> time samples overlap by a factor of </a:t>
             </a:r>
             <a:r>
               <a:rPr lang="en-US" dirty="0" err="1">
@@ -5830,7 +5822,7 @@
           <a:p>
             <a:r>
               <a:rPr lang="en-NZ" dirty="0"/>
-              <a:t>Blocks are offset by </a:t>
+              <a:t>Consecutive blocks are offset by </a:t>
             </a:r>
             <a:r>
               <a:rPr lang="en-US" dirty="0" err="1">
@@ -5873,9 +5865,118 @@
               <a:t>overlap</a:t>
             </a:r>
             <a:r>
+              <a:rPr lang="en-NZ"/>
+              <a:t> samples</a:t>
+            </a:r>
+            <a:endParaRPr lang="en-NZ" dirty="0"/>
+          </a:p>
+          <a:p>
+            <a:r>
               <a:rPr lang="en-NZ" dirty="0"/>
-              <a:t> time samples</a:t>
-            </a:r>
+              <a:t>After the first block of </a:t>
+            </a:r>
+            <a:r>
+              <a:rPr lang="en-US" dirty="0">
+                <a:solidFill>
+                  <a:schemeClr val="accent1"/>
+                </a:solidFill>
+              </a:rPr>
+              <a:t>M </a:t>
+            </a:r>
+            <a:r>
+              <a:rPr lang="en-NZ" dirty="0"/>
+              <a:t>time samples, each additional block requires an additional </a:t>
+            </a:r>
+            <a:r>
+              <a:rPr lang="en-US" dirty="0" err="1">
+                <a:solidFill>
+                  <a:schemeClr val="accent1"/>
+                </a:solidFill>
+              </a:rPr>
+              <a:t>idat</a:t>
+            </a:r>
+            <a:r>
+              <a:rPr lang="en-US" baseline="-25000" dirty="0" err="1">
+                <a:solidFill>
+                  <a:schemeClr val="accent1"/>
+                </a:solidFill>
+              </a:rPr>
+              <a:t>off</a:t>
+            </a:r>
+            <a:r>
+              <a:rPr lang="en-NZ" dirty="0"/>
+              <a:t> samples; therefore,</a:t>
+            </a:r>
+          </a:p>
+          <a:p>
+            <a:pPr marL="0" indent="0" algn="ctr">
+              <a:buNone/>
+            </a:pPr>
+            <a:r>
+              <a:rPr lang="en-US" dirty="0" err="1">
+                <a:solidFill>
+                  <a:schemeClr val="accent1"/>
+                </a:solidFill>
+              </a:rPr>
+              <a:t>N</a:t>
+            </a:r>
+            <a:r>
+              <a:rPr lang="en-US" baseline="-25000" dirty="0" err="1">
+                <a:solidFill>
+                  <a:schemeClr val="accent1"/>
+                </a:solidFill>
+              </a:rPr>
+              <a:t>block</a:t>
+            </a:r>
+            <a:r>
+              <a:rPr lang="en-US" dirty="0">
+                <a:solidFill>
+                  <a:schemeClr val="accent1"/>
+                </a:solidFill>
+              </a:rPr>
+              <a:t> = (</a:t>
+            </a:r>
+            <a:r>
+              <a:rPr lang="en-US" dirty="0" err="1">
+                <a:solidFill>
+                  <a:schemeClr val="accent1"/>
+                </a:solidFill>
+              </a:rPr>
+              <a:t>ndat</a:t>
+            </a:r>
+            <a:r>
+              <a:rPr lang="en-US" dirty="0">
+                <a:solidFill>
+                  <a:schemeClr val="accent1"/>
+                </a:solidFill>
+              </a:rPr>
+              <a:t> - M) / </a:t>
+            </a:r>
+            <a:r>
+              <a:rPr lang="en-US" dirty="0" err="1">
+                <a:solidFill>
+                  <a:schemeClr val="accent1"/>
+                </a:solidFill>
+              </a:rPr>
+              <a:t>idat</a:t>
+            </a:r>
+            <a:r>
+              <a:rPr lang="en-US" baseline="-25000" dirty="0" err="1">
+                <a:solidFill>
+                  <a:schemeClr val="accent1"/>
+                </a:solidFill>
+              </a:rPr>
+              <a:t>off</a:t>
+            </a:r>
+            <a:r>
+              <a:rPr lang="en-US" dirty="0">
+                <a:solidFill>
+                  <a:schemeClr val="accent1"/>
+                </a:solidFill>
+              </a:rPr>
+              <a:t> + 1</a:t>
+            </a:r>
+            <a:endParaRPr lang="en-NZ" dirty="0"/>
           </a:p>
           <a:p>
             <a:r>
@@ -5968,7 +6069,7 @@
             </a:r>
             <a:r>
               <a:rPr lang="en-NZ" dirty="0"/>
-              <a:t> is instructed to store all time samples from </a:t>
+              <a:t> is stores all time samples from </a:t>
             </a:r>
             <a:r>
               <a:rPr lang="en-US" dirty="0" err="1">
@@ -6050,7 +6151,7 @@
             </a:r>
             <a:r>
               <a:rPr lang="en-NZ" dirty="0"/>
-              <a:t>will be the current </a:t>
+              <a:t>will equal the current </a:t>
             </a:r>
             <a:r>
               <a:rPr lang="en-US" dirty="0" err="1">

</xml_diff>